<commit_message>
complete LegacyCode presentaion and code exapmles
</commit_message>
<xml_diff>
--- a/Test Driven Development/materials/pptx/5. TDD-EasyMock.pptx
+++ b/Test Driven Development/materials/pptx/5. TDD-EasyMock.pptx
@@ -25695,7 +25695,7 @@
         <p:spPr>
           <a:xfrm>
             <a:off x="403726" y="1219200"/>
-            <a:ext cx="10690225" cy="4278094"/>
+            <a:ext cx="10690225" cy="4031873"/>
           </a:xfrm>
           <a:prstGeom prst="rect">
             <a:avLst/>
@@ -26202,140 +26202,153 @@
                 </a:solidFill>
                 <a:latin typeface="Menlo"/>
               </a:rPr>
+              <a:t>)</a:t>
+            </a:r>
+            <a:r>
+              <a:rPr lang="fr-FR" sz="1600" dirty="0" smtClean="0">
+                <a:solidFill>
+                  <a:srgbClr val="000000"/>
+                </a:solidFill>
+                <a:latin typeface="Menlo"/>
+              </a:rPr>
+              <a:t>;</a:t>
+            </a:r>
+          </a:p>
+          <a:p>
+            <a:r>
+              <a:rPr lang="fr-FR" sz="1600" dirty="0">
+                <a:solidFill>
+                  <a:srgbClr val="000000"/>
+                </a:solidFill>
+                <a:latin typeface="Menlo"/>
+              </a:rPr>
+              <a:t>	</a:t>
+            </a:r>
+            <a:r>
+              <a:rPr lang="en-US" sz="1600" dirty="0" smtClean="0">
+                <a:solidFill>
+                  <a:srgbClr val="000000"/>
+                </a:solidFill>
+                <a:latin typeface="Menlo"/>
+              </a:rPr>
+              <a:t>} </a:t>
+            </a:r>
+            <a:r>
+              <a:rPr lang="en-US" sz="1600" b="1" dirty="0">
+                <a:solidFill>
+                  <a:srgbClr val="000080"/>
+                </a:solidFill>
+                <a:latin typeface="Menlo"/>
+              </a:rPr>
+              <a:t>catch</a:t>
+            </a:r>
+            <a:r>
+              <a:rPr lang="en-US" sz="1600" dirty="0">
+                <a:solidFill>
+                  <a:srgbClr val="000080"/>
+                </a:solidFill>
+                <a:latin typeface="Menlo"/>
+              </a:rPr>
+              <a:t> </a:t>
+            </a:r>
+            <a:r>
+              <a:rPr lang="en-US" sz="1600" dirty="0">
+                <a:solidFill>
+                  <a:srgbClr val="000000"/>
+                </a:solidFill>
+                <a:latin typeface="Menlo"/>
+              </a:rPr>
+              <a:t>(</a:t>
+            </a:r>
+            <a:r>
+              <a:rPr lang="en-US" sz="1600" dirty="0" err="1">
+                <a:solidFill>
+                  <a:srgbClr val="000000"/>
+                </a:solidFill>
+                <a:latin typeface="Menlo"/>
+              </a:rPr>
+              <a:t>EpisodeNotFoundException</a:t>
+            </a:r>
+            <a:r>
+              <a:rPr lang="en-US" sz="1600" dirty="0">
+                <a:solidFill>
+                  <a:srgbClr val="000000"/>
+                </a:solidFill>
+                <a:latin typeface="Menlo"/>
+              </a:rPr>
+              <a:t> e) </a:t>
+            </a:r>
+            <a:r>
+              <a:rPr lang="en-US" sz="1600" dirty="0" smtClean="0">
+                <a:solidFill>
+                  <a:srgbClr val="000000"/>
+                </a:solidFill>
+                <a:latin typeface="Menlo"/>
+              </a:rPr>
+              <a:t>{</a:t>
+            </a:r>
+          </a:p>
+          <a:p>
+            <a:r>
+              <a:rPr lang="en-US" sz="1600" dirty="0" smtClean="0">
+                <a:latin typeface="Menlo"/>
+              </a:rPr>
+              <a:t>		</a:t>
+            </a:r>
+            <a:r>
+              <a:rPr lang="en-US" sz="1600" dirty="0" smtClean="0">
+                <a:solidFill>
+                  <a:srgbClr val="000000"/>
+                </a:solidFill>
+                <a:latin typeface="Menlo"/>
+              </a:rPr>
+              <a:t>fail</a:t>
+            </a:r>
+            <a:r>
+              <a:rPr lang="en-US" sz="1600" dirty="0">
+                <a:solidFill>
+                  <a:srgbClr val="000000"/>
+                </a:solidFill>
+                <a:latin typeface="Menlo"/>
+              </a:rPr>
+              <a:t>(</a:t>
+            </a:r>
+            <a:r>
+              <a:rPr lang="en-US" sz="1600" b="1" dirty="0">
+                <a:solidFill>
+                  <a:srgbClr val="009900"/>
+                </a:solidFill>
+                <a:latin typeface="Menlo"/>
+              </a:rPr>
+              <a:t>"Expected </a:t>
+            </a:r>
+            <a:r>
+              <a:rPr lang="en-US" sz="1600" b="1" dirty="0" err="1">
+                <a:solidFill>
+                  <a:srgbClr val="009900"/>
+                </a:solidFill>
+                <a:latin typeface="Menlo"/>
+              </a:rPr>
+              <a:t>EpisodeNotFoundException</a:t>
+            </a:r>
+            <a:r>
+              <a:rPr lang="en-US" sz="1600" b="1" dirty="0">
+                <a:solidFill>
+                  <a:srgbClr val="009900"/>
+                </a:solidFill>
+                <a:latin typeface="Menlo"/>
+              </a:rPr>
+              <a:t>"</a:t>
+            </a:r>
+            <a:r>
+              <a:rPr lang="en-US" sz="1600" dirty="0">
+                <a:solidFill>
+                  <a:srgbClr val="000000"/>
+                </a:solidFill>
+                <a:latin typeface="Menlo"/>
+              </a:rPr>
               <a:t>);</a:t>
             </a:r>
-          </a:p>
-          <a:p>
-            <a:r>
-              <a:rPr lang="en-US" sz="1600" dirty="0">
-                <a:latin typeface="Menlo"/>
-              </a:rPr>
-              <a:t>        </a:t>
-            </a:r>
-            <a:r>
-              <a:rPr lang="en-US" sz="1600" dirty="0">
-                <a:solidFill>
-                  <a:srgbClr val="000000"/>
-                </a:solidFill>
-                <a:latin typeface="Menlo"/>
-              </a:rPr>
-              <a:t>fail(</a:t>
-            </a:r>
-            <a:r>
-              <a:rPr lang="en-US" sz="1600" b="1" dirty="0">
-                <a:solidFill>
-                  <a:srgbClr val="009900"/>
-                </a:solidFill>
-                <a:latin typeface="Menlo"/>
-              </a:rPr>
-              <a:t>"Expected </a:t>
-            </a:r>
-            <a:r>
-              <a:rPr lang="en-US" sz="1600" b="1" dirty="0" err="1">
-                <a:solidFill>
-                  <a:srgbClr val="009900"/>
-                </a:solidFill>
-                <a:latin typeface="Menlo"/>
-              </a:rPr>
-              <a:t>EpisodeNotFoundException</a:t>
-            </a:r>
-            <a:r>
-              <a:rPr lang="en-US" sz="1600" b="1" dirty="0">
-                <a:solidFill>
-                  <a:srgbClr val="009900"/>
-                </a:solidFill>
-                <a:latin typeface="Menlo"/>
-              </a:rPr>
-              <a:t>"</a:t>
-            </a:r>
-            <a:r>
-              <a:rPr lang="en-US" sz="1600" dirty="0">
-                <a:solidFill>
-                  <a:srgbClr val="000000"/>
-                </a:solidFill>
-                <a:latin typeface="Menlo"/>
-              </a:rPr>
-              <a:t>);</a:t>
-            </a:r>
-          </a:p>
-          <a:p>
-            <a:r>
-              <a:rPr lang="en-US" sz="1600" dirty="0">
-                <a:latin typeface="Menlo"/>
-              </a:rPr>
-              <a:t>    </a:t>
-            </a:r>
-            <a:r>
-              <a:rPr lang="en-US" sz="1600" dirty="0">
-                <a:solidFill>
-                  <a:srgbClr val="000000"/>
-                </a:solidFill>
-                <a:latin typeface="Menlo"/>
-              </a:rPr>
-              <a:t>} </a:t>
-            </a:r>
-            <a:r>
-              <a:rPr lang="en-US" sz="1600" b="1" dirty="0">
-                <a:solidFill>
-                  <a:srgbClr val="000080"/>
-                </a:solidFill>
-                <a:latin typeface="Menlo"/>
-              </a:rPr>
-              <a:t>catch</a:t>
-            </a:r>
-            <a:r>
-              <a:rPr lang="en-US" sz="1600" dirty="0">
-                <a:solidFill>
-                  <a:srgbClr val="000080"/>
-                </a:solidFill>
-                <a:latin typeface="Menlo"/>
-              </a:rPr>
-              <a:t> </a:t>
-            </a:r>
-            <a:r>
-              <a:rPr lang="en-US" sz="1600" dirty="0">
-                <a:solidFill>
-                  <a:srgbClr val="000000"/>
-                </a:solidFill>
-                <a:latin typeface="Menlo"/>
-              </a:rPr>
-              <a:t>(</a:t>
-            </a:r>
-            <a:r>
-              <a:rPr lang="en-US" sz="1600" dirty="0" err="1">
-                <a:solidFill>
-                  <a:srgbClr val="000000"/>
-                </a:solidFill>
-                <a:latin typeface="Menlo"/>
-              </a:rPr>
-              <a:t>EpisodeNotFoundException</a:t>
-            </a:r>
-            <a:r>
-              <a:rPr lang="en-US" sz="1600" dirty="0">
-                <a:solidFill>
-                  <a:srgbClr val="000000"/>
-                </a:solidFill>
-                <a:latin typeface="Menlo"/>
-              </a:rPr>
-              <a:t> e) </a:t>
-            </a:r>
-            <a:r>
-              <a:rPr lang="en-US" sz="1600" dirty="0" smtClean="0">
-                <a:solidFill>
-                  <a:srgbClr val="000000"/>
-                </a:solidFill>
-                <a:latin typeface="Menlo"/>
-              </a:rPr>
-              <a:t>{</a:t>
-            </a:r>
-          </a:p>
-          <a:p>
-            <a:endParaRPr lang="en-US" sz="1600" dirty="0">
-              <a:solidFill>
-                <a:srgbClr val="000000"/>
-              </a:solidFill>
-              <a:latin typeface="Menlo"/>
-            </a:endParaRPr>
           </a:p>
           <a:p>
             <a:r>

</xml_diff>